<commit_message>
add more infos(organization, knox id)
</commit_message>
<xml_diff>
--- a/CRA_team_C.pptx
+++ b/CRA_team_C.pptx
@@ -264,7 +264,7 @@
       <p15:sldGuideLst xmlns:p15="http://schemas.microsoft.com/office/powerpoint/2012/main"/>
     </p:ext>
     <p:ext uri="GoogleSlidesCustomDataVersion2">
-      <go:slidesCustomData xmlns="" xmlns:mc="http://schemas.openxmlformats.org/markup-compatibility/2006" xmlns:mv="urn:schemas-microsoft-com:mac:vml" xmlns:c="http://schemas.openxmlformats.org/drawingml/2006/chart" xmlns:dgm="http://schemas.openxmlformats.org/drawingml/2006/diagram" xmlns:o="urn:schemas-microsoft-com:office:office" xmlns:v="urn:schemas-microsoft-com:vml" xmlns:pvml="urn:schemas-microsoft-com:office:powerpoint" xmlns:com="http://schemas.openxmlformats.org/drawingml/2006/compatibility" xmlns:p14="http://schemas.microsoft.com/office/powerpoint/2010/main" xmlns:p15="http://schemas.microsoft.com/office/powerpoint/2012/main" xmlns:ahyp="http://schemas.microsoft.com/office/drawing/2018/hyperlinkcolor" xmlns:go="http://customooxmlschemas.google.com/" r:id="rId22" roundtripDataSignature="AMtx7mj5GdbxsaFl02bTEFBl/9s84/Z/Bw=="/>
+      <go:slidesCustomData xmlns:go="http://customooxmlschemas.google.com/" xmlns:ahyp="http://schemas.microsoft.com/office/drawing/2018/hyperlinkcolor" xmlns:p15="http://schemas.microsoft.com/office/powerpoint/2012/main" xmlns:p14="http://schemas.microsoft.com/office/powerpoint/2010/main" xmlns:com="http://schemas.openxmlformats.org/drawingml/2006/compatibility" xmlns:pvml="urn:schemas-microsoft-com:office:powerpoint" xmlns:v="urn:schemas-microsoft-com:vml" xmlns:o="urn:schemas-microsoft-com:office:office" xmlns:dgm="http://schemas.openxmlformats.org/drawingml/2006/diagram" xmlns:c="http://schemas.openxmlformats.org/drawingml/2006/chart" xmlns:mv="urn:schemas-microsoft-com:mac:vml" xmlns:mc="http://schemas.openxmlformats.org/markup-compatibility/2006" xmlns="" r:id="rId22" roundtripDataSignature="AMtx7mj5GdbxsaFl02bTEFBl/9s84/Z/Bw=="/>
     </p:ext>
   </p:extLst>
 </p:presentation>
@@ -20954,7 +20954,7 @@
         </p:nvSpPr>
         <p:spPr>
           <a:xfrm>
-            <a:off x="1599524" y="2580585"/>
+            <a:off x="1257320" y="2193625"/>
             <a:ext cx="2506464" cy="649800"/>
           </a:xfrm>
           <a:prstGeom prst="rect">
@@ -21243,7 +21243,7 @@
         </p:nvSpPr>
         <p:spPr>
           <a:xfrm>
-            <a:off x="6965168" y="1716171"/>
+            <a:off x="6617202" y="1731777"/>
             <a:ext cx="2646790" cy="649800"/>
           </a:xfrm>
           <a:prstGeom prst="rect">
@@ -21532,7 +21532,7 @@
         </p:nvSpPr>
         <p:spPr>
           <a:xfrm>
-            <a:off x="9385013" y="3865797"/>
+            <a:off x="9137079" y="4014080"/>
             <a:ext cx="2506464" cy="649800"/>
           </a:xfrm>
           <a:prstGeom prst="rect">
@@ -21821,7 +21821,7 @@
         </p:nvSpPr>
         <p:spPr>
           <a:xfrm>
-            <a:off x="1639239" y="4515597"/>
+            <a:off x="1592393" y="4547519"/>
             <a:ext cx="2506464" cy="649800"/>
           </a:xfrm>
           <a:prstGeom prst="rect">
@@ -22110,7 +22110,7 @@
         </p:nvSpPr>
         <p:spPr>
           <a:xfrm>
-            <a:off x="1842511" y="3053771"/>
+            <a:off x="1291718" y="3132888"/>
             <a:ext cx="2506464" cy="649800"/>
           </a:xfrm>
           <a:prstGeom prst="rect">
@@ -22400,7 +22400,7 @@
         </p:nvSpPr>
         <p:spPr>
           <a:xfrm>
-            <a:off x="1298973" y="5128095"/>
+            <a:off x="1400166" y="5470740"/>
             <a:ext cx="2506464" cy="649800"/>
           </a:xfrm>
           <a:prstGeom prst="rect">
@@ -22690,7 +22690,7 @@
         </p:nvSpPr>
         <p:spPr>
           <a:xfrm>
-            <a:off x="6999445" y="2190852"/>
+            <a:off x="7913273" y="2234692"/>
             <a:ext cx="2646790" cy="649800"/>
           </a:xfrm>
           <a:prstGeom prst="rect">
@@ -22983,7 +22983,7 @@
         </p:nvSpPr>
         <p:spPr>
           <a:xfrm>
-            <a:off x="9299529" y="4405869"/>
+            <a:off x="9051595" y="4987654"/>
             <a:ext cx="2506464" cy="649800"/>
           </a:xfrm>
           <a:prstGeom prst="rect">
@@ -23257,6 +23257,738 @@
               <a:rPr lang="ko-KR" altLang="en-US" sz="1800" dirty="0"/>
               <a:t>구현</a:t>
             </a:r>
+          </a:p>
+        </p:txBody>
+      </p:sp>
+      <p:sp>
+        <p:nvSpPr>
+          <p:cNvPr id="15" name="Google Shape;59;p3">
+            <a:extLst>
+              <a:ext uri="{FF2B5EF4-FFF2-40B4-BE49-F238E27FC236}">
+                <a16:creationId xmlns:a16="http://schemas.microsoft.com/office/drawing/2014/main" id="{2ED382C8-AE44-4D01-80C0-8BEA13A28D73}"/>
+              </a:ext>
+            </a:extLst>
+          </p:cNvPr>
+          <p:cNvSpPr txBox="1">
+            <a:spLocks/>
+          </p:cNvSpPr>
+          <p:nvPr/>
+        </p:nvSpPr>
+        <p:spPr>
+          <a:xfrm>
+            <a:off x="9187362" y="4453727"/>
+            <a:ext cx="2451640" cy="692475"/>
+          </a:xfrm>
+          <a:prstGeom prst="rect">
+            <a:avLst/>
+          </a:prstGeom>
+          <a:noFill/>
+          <a:ln>
+            <a:noFill/>
+          </a:ln>
+        </p:spPr>
+        <p:txBody>
+          <a:bodyPr spcFirstLastPara="1" wrap="square" lIns="91425" tIns="45700" rIns="91425" bIns="45700" anchor="ctr" anchorCtr="0">
+            <a:normAutofit/>
+          </a:bodyPr>
+          <a:lstStyle>
+            <a:defPPr marR="0" lvl="0" algn="l" rtl="0">
+              <a:lnSpc>
+                <a:spcPct val="100000"/>
+              </a:lnSpc>
+              <a:spcBef>
+                <a:spcPts val="0"/>
+              </a:spcBef>
+              <a:spcAft>
+                <a:spcPts val="0"/>
+              </a:spcAft>
+              <a:defRPr/>
+            </a:defPPr>
+            <a:lvl1pPr>
+              <a:lnSpc>
+                <a:spcPct val="90000"/>
+              </a:lnSpc>
+              <a:buClr>
+                <a:schemeClr val="dk1"/>
+              </a:buClr>
+              <a:buSzPts val="4400"/>
+              <a:buFont typeface="Malgun Gothic"/>
+              <a:buNone/>
+              <a:defRPr>
+                <a:solidFill>
+                  <a:schemeClr val="bg1">
+                    <a:lumMod val="65000"/>
+                  </a:schemeClr>
+                </a:solidFill>
+                <a:latin typeface="Malgun Gothic"/>
+                <a:ea typeface="Malgun Gothic"/>
+                <a:cs typeface="Malgun Gothic"/>
+              </a:defRPr>
+            </a:lvl1pPr>
+            <a:lvl2pPr>
+              <a:buSzPts val="1400"/>
+              <a:buNone/>
+              <a:defRPr sz="1800"/>
+            </a:lvl2pPr>
+            <a:lvl3pPr>
+              <a:buSzPts val="1400"/>
+              <a:buNone/>
+              <a:defRPr sz="1800"/>
+            </a:lvl3pPr>
+            <a:lvl4pPr>
+              <a:buSzPts val="1400"/>
+              <a:buNone/>
+              <a:defRPr sz="1800"/>
+            </a:lvl4pPr>
+            <a:lvl5pPr>
+              <a:buSzPts val="1400"/>
+              <a:buNone/>
+              <a:defRPr sz="1800"/>
+            </a:lvl5pPr>
+            <a:lvl6pPr>
+              <a:buSzPts val="1400"/>
+              <a:buNone/>
+              <a:defRPr sz="1800"/>
+            </a:lvl6pPr>
+            <a:lvl7pPr>
+              <a:buSzPts val="1400"/>
+              <a:buNone/>
+              <a:defRPr sz="1800"/>
+            </a:lvl7pPr>
+            <a:lvl8pPr>
+              <a:buSzPts val="1400"/>
+              <a:buNone/>
+              <a:defRPr sz="1800"/>
+            </a:lvl8pPr>
+            <a:lvl9pPr>
+              <a:buSzPts val="1400"/>
+              <a:buNone/>
+              <a:defRPr sz="1800"/>
+            </a:lvl9pPr>
+          </a:lstStyle>
+          <a:p>
+            <a:r>
+              <a:rPr lang="ko-KR" altLang="en-US" dirty="0"/>
+              <a:t>메모리사업부 </a:t>
+            </a:r>
+            <a:r>
+              <a:rPr lang="en-US" altLang="ko-KR" dirty="0"/>
+              <a:t>S/W</a:t>
+            </a:r>
+            <a:r>
+              <a:rPr lang="ko-KR" altLang="en-US" dirty="0"/>
+              <a:t>개발팀</a:t>
+            </a:r>
+            <a:endParaRPr lang="en-US" altLang="ko-KR" dirty="0"/>
+          </a:p>
+          <a:p>
+            <a:r>
+              <a:rPr lang="en-US" altLang="ko-KR" dirty="0"/>
+              <a:t>eunji95.kang </a:t>
+            </a:r>
+            <a:endParaRPr lang="ko-KR" altLang="en-US" dirty="0"/>
+          </a:p>
+        </p:txBody>
+      </p:sp>
+      <p:sp>
+        <p:nvSpPr>
+          <p:cNvPr id="16" name="Google Shape;59;p3">
+            <a:extLst>
+              <a:ext uri="{FF2B5EF4-FFF2-40B4-BE49-F238E27FC236}">
+                <a16:creationId xmlns:a16="http://schemas.microsoft.com/office/drawing/2014/main" id="{97904E2A-C9AD-4F5B-9877-E607B514C72D}"/>
+              </a:ext>
+            </a:extLst>
+          </p:cNvPr>
+          <p:cNvSpPr txBox="1">
+            <a:spLocks/>
+          </p:cNvSpPr>
+          <p:nvPr/>
+        </p:nvSpPr>
+        <p:spPr>
+          <a:xfrm>
+            <a:off x="7897219" y="1731777"/>
+            <a:ext cx="3284564" cy="649800"/>
+          </a:xfrm>
+          <a:prstGeom prst="rect">
+            <a:avLst/>
+          </a:prstGeom>
+          <a:noFill/>
+          <a:ln>
+            <a:noFill/>
+          </a:ln>
+        </p:spPr>
+        <p:txBody>
+          <a:bodyPr spcFirstLastPara="1" wrap="square" lIns="91425" tIns="45700" rIns="91425" bIns="45700" anchor="ctr" anchorCtr="0">
+            <a:normAutofit/>
+          </a:bodyPr>
+          <a:lstStyle>
+            <a:defPPr marR="0" lvl="0" algn="l" rtl="0">
+              <a:lnSpc>
+                <a:spcPct val="100000"/>
+              </a:lnSpc>
+              <a:spcBef>
+                <a:spcPts val="0"/>
+              </a:spcBef>
+              <a:spcAft>
+                <a:spcPts val="0"/>
+              </a:spcAft>
+              <a:defRPr/>
+            </a:defPPr>
+            <a:lvl1pPr>
+              <a:lnSpc>
+                <a:spcPct val="90000"/>
+              </a:lnSpc>
+              <a:buClr>
+                <a:schemeClr val="dk1"/>
+              </a:buClr>
+              <a:buSzPts val="4400"/>
+              <a:buFont typeface="Malgun Gothic"/>
+              <a:buNone/>
+              <a:defRPr>
+                <a:solidFill>
+                  <a:schemeClr val="bg1">
+                    <a:lumMod val="65000"/>
+                  </a:schemeClr>
+                </a:solidFill>
+                <a:latin typeface="Malgun Gothic"/>
+                <a:ea typeface="Malgun Gothic"/>
+                <a:cs typeface="Malgun Gothic"/>
+              </a:defRPr>
+            </a:lvl1pPr>
+            <a:lvl2pPr>
+              <a:buSzPts val="1400"/>
+              <a:buNone/>
+              <a:defRPr sz="1800"/>
+            </a:lvl2pPr>
+            <a:lvl3pPr>
+              <a:buSzPts val="1400"/>
+              <a:buNone/>
+              <a:defRPr sz="1800"/>
+            </a:lvl3pPr>
+            <a:lvl4pPr>
+              <a:buSzPts val="1400"/>
+              <a:buNone/>
+              <a:defRPr sz="1800"/>
+            </a:lvl4pPr>
+            <a:lvl5pPr>
+              <a:buSzPts val="1400"/>
+              <a:buNone/>
+              <a:defRPr sz="1800"/>
+            </a:lvl5pPr>
+            <a:lvl6pPr>
+              <a:buSzPts val="1400"/>
+              <a:buNone/>
+              <a:defRPr sz="1800"/>
+            </a:lvl6pPr>
+            <a:lvl7pPr>
+              <a:buSzPts val="1400"/>
+              <a:buNone/>
+              <a:defRPr sz="1800"/>
+            </a:lvl7pPr>
+            <a:lvl8pPr>
+              <a:buSzPts val="1400"/>
+              <a:buNone/>
+              <a:defRPr sz="1800"/>
+            </a:lvl8pPr>
+            <a:lvl9pPr>
+              <a:buSzPts val="1400"/>
+              <a:buNone/>
+              <a:defRPr sz="1800"/>
+            </a:lvl9pPr>
+          </a:lstStyle>
+          <a:p>
+            <a:r>
+              <a:rPr lang="ko-KR" altLang="en-US" dirty="0"/>
+              <a:t>메모리사업부 </a:t>
+            </a:r>
+            <a:r>
+              <a:rPr lang="en-US" altLang="ko-KR" dirty="0"/>
+              <a:t>Solution</a:t>
+            </a:r>
+            <a:r>
+              <a:rPr lang="ko-KR" altLang="en-US" dirty="0"/>
+              <a:t>플랫폼 개발팀</a:t>
+            </a:r>
+            <a:endParaRPr lang="en-US" altLang="ko-KR" dirty="0"/>
+          </a:p>
+          <a:p>
+            <a:r>
+              <a:rPr lang="en-US" altLang="ko-KR" dirty="0" err="1"/>
+              <a:t>matzmoto.seo</a:t>
+            </a:r>
+            <a:endParaRPr lang="ko-KR" altLang="en-US" dirty="0"/>
+          </a:p>
+        </p:txBody>
+      </p:sp>
+      <p:sp>
+        <p:nvSpPr>
+          <p:cNvPr id="17" name="Google Shape;59;p3">
+            <a:extLst>
+              <a:ext uri="{FF2B5EF4-FFF2-40B4-BE49-F238E27FC236}">
+                <a16:creationId xmlns:a16="http://schemas.microsoft.com/office/drawing/2014/main" id="{11669E39-997D-4D1E-AAE3-04AB5656A574}"/>
+              </a:ext>
+            </a:extLst>
+          </p:cNvPr>
+          <p:cNvSpPr txBox="1">
+            <a:spLocks/>
+          </p:cNvSpPr>
+          <p:nvPr/>
+        </p:nvSpPr>
+        <p:spPr>
+          <a:xfrm>
+            <a:off x="1297276" y="2688384"/>
+            <a:ext cx="2248030" cy="649800"/>
+          </a:xfrm>
+          <a:prstGeom prst="rect">
+            <a:avLst/>
+          </a:prstGeom>
+          <a:noFill/>
+          <a:ln>
+            <a:noFill/>
+          </a:ln>
+        </p:spPr>
+        <p:txBody>
+          <a:bodyPr spcFirstLastPara="1" wrap="square" lIns="91425" tIns="45700" rIns="91425" bIns="45700" anchor="ctr" anchorCtr="0">
+            <a:normAutofit/>
+          </a:bodyPr>
+          <a:lstStyle>
+            <a:defPPr marR="0" lvl="0" algn="l" rtl="0">
+              <a:lnSpc>
+                <a:spcPct val="100000"/>
+              </a:lnSpc>
+              <a:spcBef>
+                <a:spcPts val="0"/>
+              </a:spcBef>
+              <a:spcAft>
+                <a:spcPts val="0"/>
+              </a:spcAft>
+            </a:defPPr>
+            <a:lvl1pPr marR="0" lvl="0" algn="l" rtl="0">
+              <a:lnSpc>
+                <a:spcPct val="90000"/>
+              </a:lnSpc>
+              <a:spcBef>
+                <a:spcPts val="0"/>
+              </a:spcBef>
+              <a:spcAft>
+                <a:spcPts val="0"/>
+              </a:spcAft>
+              <a:buClr>
+                <a:schemeClr val="dk1"/>
+              </a:buClr>
+              <a:buSzPts val="1800"/>
+              <a:buFont typeface="Malgun Gothic"/>
+              <a:buNone/>
+              <a:defRPr sz="4400" b="0" i="0" u="none" strike="noStrike" cap="none">
+                <a:solidFill>
+                  <a:schemeClr val="dk1"/>
+                </a:solidFill>
+                <a:latin typeface="Malgun Gothic"/>
+                <a:ea typeface="Malgun Gothic"/>
+                <a:cs typeface="Malgun Gothic"/>
+                <a:sym typeface="Malgun Gothic"/>
+              </a:defRPr>
+            </a:lvl1pPr>
+            <a:lvl2pPr marR="0" lvl="1" algn="l" rtl="0">
+              <a:lnSpc>
+                <a:spcPct val="100000"/>
+              </a:lnSpc>
+              <a:spcBef>
+                <a:spcPts val="0"/>
+              </a:spcBef>
+              <a:spcAft>
+                <a:spcPts val="0"/>
+              </a:spcAft>
+              <a:buClr>
+                <a:srgbClr val="000000"/>
+              </a:buClr>
+              <a:buSzPts val="1400"/>
+              <a:buFont typeface="Arial"/>
+              <a:buNone/>
+              <a:defRPr sz="1800" b="0" i="0" u="none" strike="noStrike" cap="none">
+                <a:solidFill>
+                  <a:srgbClr val="000000"/>
+                </a:solidFill>
+                <a:latin typeface="Arial"/>
+                <a:ea typeface="Arial"/>
+                <a:cs typeface="Arial"/>
+                <a:sym typeface="Arial"/>
+              </a:defRPr>
+            </a:lvl2pPr>
+            <a:lvl3pPr marR="0" lvl="2" algn="l" rtl="0">
+              <a:lnSpc>
+                <a:spcPct val="100000"/>
+              </a:lnSpc>
+              <a:spcBef>
+                <a:spcPts val="0"/>
+              </a:spcBef>
+              <a:spcAft>
+                <a:spcPts val="0"/>
+              </a:spcAft>
+              <a:buClr>
+                <a:srgbClr val="000000"/>
+              </a:buClr>
+              <a:buSzPts val="1400"/>
+              <a:buFont typeface="Arial"/>
+              <a:buNone/>
+              <a:defRPr sz="1800" b="0" i="0" u="none" strike="noStrike" cap="none">
+                <a:solidFill>
+                  <a:srgbClr val="000000"/>
+                </a:solidFill>
+                <a:latin typeface="Arial"/>
+                <a:ea typeface="Arial"/>
+                <a:cs typeface="Arial"/>
+                <a:sym typeface="Arial"/>
+              </a:defRPr>
+            </a:lvl3pPr>
+            <a:lvl4pPr marR="0" lvl="3" algn="l" rtl="0">
+              <a:lnSpc>
+                <a:spcPct val="100000"/>
+              </a:lnSpc>
+              <a:spcBef>
+                <a:spcPts val="0"/>
+              </a:spcBef>
+              <a:spcAft>
+                <a:spcPts val="0"/>
+              </a:spcAft>
+              <a:buClr>
+                <a:srgbClr val="000000"/>
+              </a:buClr>
+              <a:buSzPts val="1400"/>
+              <a:buFont typeface="Arial"/>
+              <a:buNone/>
+              <a:defRPr sz="1800" b="0" i="0" u="none" strike="noStrike" cap="none">
+                <a:solidFill>
+                  <a:srgbClr val="000000"/>
+                </a:solidFill>
+                <a:latin typeface="Arial"/>
+                <a:ea typeface="Arial"/>
+                <a:cs typeface="Arial"/>
+                <a:sym typeface="Arial"/>
+              </a:defRPr>
+            </a:lvl4pPr>
+            <a:lvl5pPr marR="0" lvl="4" algn="l" rtl="0">
+              <a:lnSpc>
+                <a:spcPct val="100000"/>
+              </a:lnSpc>
+              <a:spcBef>
+                <a:spcPts val="0"/>
+              </a:spcBef>
+              <a:spcAft>
+                <a:spcPts val="0"/>
+              </a:spcAft>
+              <a:buClr>
+                <a:srgbClr val="000000"/>
+              </a:buClr>
+              <a:buSzPts val="1400"/>
+              <a:buFont typeface="Arial"/>
+              <a:buNone/>
+              <a:defRPr sz="1800" b="0" i="0" u="none" strike="noStrike" cap="none">
+                <a:solidFill>
+                  <a:srgbClr val="000000"/>
+                </a:solidFill>
+                <a:latin typeface="Arial"/>
+                <a:ea typeface="Arial"/>
+                <a:cs typeface="Arial"/>
+                <a:sym typeface="Arial"/>
+              </a:defRPr>
+            </a:lvl5pPr>
+            <a:lvl6pPr marR="0" lvl="5" algn="l" rtl="0">
+              <a:lnSpc>
+                <a:spcPct val="100000"/>
+              </a:lnSpc>
+              <a:spcBef>
+                <a:spcPts val="0"/>
+              </a:spcBef>
+              <a:spcAft>
+                <a:spcPts val="0"/>
+              </a:spcAft>
+              <a:buClr>
+                <a:srgbClr val="000000"/>
+              </a:buClr>
+              <a:buSzPts val="1400"/>
+              <a:buFont typeface="Arial"/>
+              <a:buNone/>
+              <a:defRPr sz="1800" b="0" i="0" u="none" strike="noStrike" cap="none">
+                <a:solidFill>
+                  <a:srgbClr val="000000"/>
+                </a:solidFill>
+                <a:latin typeface="Arial"/>
+                <a:ea typeface="Arial"/>
+                <a:cs typeface="Arial"/>
+                <a:sym typeface="Arial"/>
+              </a:defRPr>
+            </a:lvl6pPr>
+            <a:lvl7pPr marR="0" lvl="6" algn="l" rtl="0">
+              <a:lnSpc>
+                <a:spcPct val="100000"/>
+              </a:lnSpc>
+              <a:spcBef>
+                <a:spcPts val="0"/>
+              </a:spcBef>
+              <a:spcAft>
+                <a:spcPts val="0"/>
+              </a:spcAft>
+              <a:buClr>
+                <a:srgbClr val="000000"/>
+              </a:buClr>
+              <a:buSzPts val="1400"/>
+              <a:buFont typeface="Arial"/>
+              <a:buNone/>
+              <a:defRPr sz="1800" b="0" i="0" u="none" strike="noStrike" cap="none">
+                <a:solidFill>
+                  <a:srgbClr val="000000"/>
+                </a:solidFill>
+                <a:latin typeface="Arial"/>
+                <a:ea typeface="Arial"/>
+                <a:cs typeface="Arial"/>
+                <a:sym typeface="Arial"/>
+              </a:defRPr>
+            </a:lvl7pPr>
+            <a:lvl8pPr marR="0" lvl="7" algn="l" rtl="0">
+              <a:lnSpc>
+                <a:spcPct val="100000"/>
+              </a:lnSpc>
+              <a:spcBef>
+                <a:spcPts val="0"/>
+              </a:spcBef>
+              <a:spcAft>
+                <a:spcPts val="0"/>
+              </a:spcAft>
+              <a:buClr>
+                <a:srgbClr val="000000"/>
+              </a:buClr>
+              <a:buSzPts val="1400"/>
+              <a:buFont typeface="Arial"/>
+              <a:buNone/>
+              <a:defRPr sz="1800" b="0" i="0" u="none" strike="noStrike" cap="none">
+                <a:solidFill>
+                  <a:srgbClr val="000000"/>
+                </a:solidFill>
+                <a:latin typeface="Arial"/>
+                <a:ea typeface="Arial"/>
+                <a:cs typeface="Arial"/>
+                <a:sym typeface="Arial"/>
+              </a:defRPr>
+            </a:lvl8pPr>
+            <a:lvl9pPr marR="0" lvl="8" algn="l" rtl="0">
+              <a:lnSpc>
+                <a:spcPct val="100000"/>
+              </a:lnSpc>
+              <a:spcBef>
+                <a:spcPts val="0"/>
+              </a:spcBef>
+              <a:spcAft>
+                <a:spcPts val="0"/>
+              </a:spcAft>
+              <a:buClr>
+                <a:srgbClr val="000000"/>
+              </a:buClr>
+              <a:buSzPts val="1400"/>
+              <a:buFont typeface="Arial"/>
+              <a:buNone/>
+              <a:defRPr sz="1800" b="0" i="0" u="none" strike="noStrike" cap="none">
+                <a:solidFill>
+                  <a:srgbClr val="000000"/>
+                </a:solidFill>
+                <a:latin typeface="Arial"/>
+                <a:ea typeface="Arial"/>
+                <a:cs typeface="Arial"/>
+                <a:sym typeface="Arial"/>
+              </a:defRPr>
+            </a:lvl9pPr>
+          </a:lstStyle>
+          <a:p>
+            <a:pPr>
+              <a:buSzPts val="4400"/>
+            </a:pPr>
+            <a:r>
+              <a:rPr lang="en-US" altLang="ko-KR" sz="1400" dirty="0">
+                <a:solidFill>
+                  <a:schemeClr val="bg1">
+                    <a:lumMod val="65000"/>
+                  </a:schemeClr>
+                </a:solidFill>
+              </a:rPr>
+              <a:t>EDS </a:t>
+            </a:r>
+            <a:r>
+              <a:rPr lang="ko-KR" altLang="en-US" sz="1400" dirty="0">
+                <a:solidFill>
+                  <a:schemeClr val="bg1">
+                    <a:lumMod val="65000"/>
+                  </a:schemeClr>
+                </a:solidFill>
+              </a:rPr>
+              <a:t>설비기술그룹</a:t>
+            </a:r>
+            <a:endParaRPr lang="en-US" altLang="ko-KR" sz="1400" dirty="0">
+              <a:solidFill>
+                <a:schemeClr val="bg1">
+                  <a:lumMod val="65000"/>
+                </a:schemeClr>
+              </a:solidFill>
+            </a:endParaRPr>
+          </a:p>
+          <a:p>
+            <a:pPr>
+              <a:buSzPts val="4400"/>
+            </a:pPr>
+            <a:r>
+              <a:rPr lang="en-US" altLang="ko-KR" sz="1400" dirty="0">
+                <a:solidFill>
+                  <a:schemeClr val="bg1">
+                    <a:lumMod val="65000"/>
+                  </a:schemeClr>
+                </a:solidFill>
+              </a:rPr>
+              <a:t>sehun1029.oh</a:t>
+            </a:r>
+            <a:endParaRPr lang="ko-KR" altLang="en-US" sz="1400" dirty="0">
+              <a:solidFill>
+                <a:schemeClr val="bg1">
+                  <a:lumMod val="65000"/>
+                </a:schemeClr>
+              </a:solidFill>
+            </a:endParaRPr>
+          </a:p>
+          <a:p>
+            <a:pPr>
+              <a:buSzPts val="4400"/>
+            </a:pPr>
+            <a:endParaRPr lang="ko-KR" altLang="en-US" sz="1400" dirty="0">
+              <a:solidFill>
+                <a:schemeClr val="bg1">
+                  <a:lumMod val="65000"/>
+                </a:schemeClr>
+              </a:solidFill>
+            </a:endParaRPr>
+          </a:p>
+        </p:txBody>
+      </p:sp>
+      <p:sp>
+        <p:nvSpPr>
+          <p:cNvPr id="18" name="Google Shape;59;p3">
+            <a:extLst>
+              <a:ext uri="{FF2B5EF4-FFF2-40B4-BE49-F238E27FC236}">
+                <a16:creationId xmlns:a16="http://schemas.microsoft.com/office/drawing/2014/main" id="{77B4B8C1-EDC3-4323-AED9-4251B6BAEC1B}"/>
+              </a:ext>
+            </a:extLst>
+          </p:cNvPr>
+          <p:cNvSpPr txBox="1">
+            <a:spLocks/>
+          </p:cNvSpPr>
+          <p:nvPr/>
+        </p:nvSpPr>
+        <p:spPr>
+          <a:xfrm>
+            <a:off x="1628837" y="4963213"/>
+            <a:ext cx="2134947" cy="649800"/>
+          </a:xfrm>
+          <a:prstGeom prst="rect">
+            <a:avLst/>
+          </a:prstGeom>
+          <a:noFill/>
+          <a:ln>
+            <a:noFill/>
+          </a:ln>
+        </p:spPr>
+        <p:txBody>
+          <a:bodyPr spcFirstLastPara="1" wrap="square" lIns="91425" tIns="45700" rIns="91425" bIns="45700" anchor="ctr" anchorCtr="0">
+            <a:normAutofit/>
+          </a:bodyPr>
+          <a:lstStyle>
+            <a:defPPr marR="0" lvl="0" algn="l" rtl="0">
+              <a:lnSpc>
+                <a:spcPct val="100000"/>
+              </a:lnSpc>
+              <a:spcBef>
+                <a:spcPts val="0"/>
+              </a:spcBef>
+              <a:spcAft>
+                <a:spcPts val="0"/>
+              </a:spcAft>
+              <a:defRPr/>
+            </a:defPPr>
+            <a:lvl1pPr>
+              <a:lnSpc>
+                <a:spcPct val="90000"/>
+              </a:lnSpc>
+              <a:buClr>
+                <a:schemeClr val="dk1"/>
+              </a:buClr>
+              <a:buSzPts val="4400"/>
+              <a:buFont typeface="Malgun Gothic"/>
+              <a:buNone/>
+              <a:defRPr>
+                <a:solidFill>
+                  <a:schemeClr val="bg1">
+                    <a:lumMod val="65000"/>
+                  </a:schemeClr>
+                </a:solidFill>
+                <a:latin typeface="Malgun Gothic"/>
+                <a:ea typeface="Malgun Gothic"/>
+                <a:cs typeface="Malgun Gothic"/>
+              </a:defRPr>
+            </a:lvl1pPr>
+            <a:lvl2pPr>
+              <a:buSzPts val="1400"/>
+              <a:buNone/>
+              <a:defRPr sz="1800"/>
+            </a:lvl2pPr>
+            <a:lvl3pPr>
+              <a:buSzPts val="1400"/>
+              <a:buNone/>
+              <a:defRPr sz="1800"/>
+            </a:lvl3pPr>
+            <a:lvl4pPr>
+              <a:buSzPts val="1400"/>
+              <a:buNone/>
+              <a:defRPr sz="1800"/>
+            </a:lvl4pPr>
+            <a:lvl5pPr>
+              <a:buSzPts val="1400"/>
+              <a:buNone/>
+              <a:defRPr sz="1800"/>
+            </a:lvl5pPr>
+            <a:lvl6pPr>
+              <a:buSzPts val="1400"/>
+              <a:buNone/>
+              <a:defRPr sz="1800"/>
+            </a:lvl6pPr>
+            <a:lvl7pPr>
+              <a:buSzPts val="1400"/>
+              <a:buNone/>
+              <a:defRPr sz="1800"/>
+            </a:lvl7pPr>
+            <a:lvl8pPr>
+              <a:buSzPts val="1400"/>
+              <a:buNone/>
+              <a:defRPr sz="1800"/>
+            </a:lvl8pPr>
+            <a:lvl9pPr>
+              <a:buSzPts val="1400"/>
+              <a:buNone/>
+              <a:defRPr sz="1800"/>
+            </a:lvl9pPr>
+          </a:lstStyle>
+          <a:p>
+            <a:r>
+              <a:rPr lang="en-US" altLang="ko-KR" dirty="0"/>
+              <a:t>A-FAB</a:t>
+            </a:r>
+            <a:r>
+              <a:rPr lang="ko-KR" altLang="en-US" dirty="0"/>
+              <a:t>기술팀</a:t>
+            </a:r>
+            <a:endParaRPr lang="en-US" altLang="ko-KR" dirty="0"/>
+          </a:p>
+          <a:p>
+            <a:r>
+              <a:rPr lang="en-US" altLang="ko-KR" dirty="0"/>
+              <a:t>tw070.lim</a:t>
+            </a:r>
+            <a:endParaRPr lang="ko-KR" altLang="en-US" dirty="0"/>
           </a:p>
         </p:txBody>
       </p:sp>
@@ -23535,7 +24267,7 @@
           <p:nvPr>
             <p:extLst>
               <p:ext uri="{D42A27DB-BD31-4B8C-83A1-F6EECF244321}">
-                <p14:modId xmlns:p14="http://schemas.microsoft.com/office/powerpoint/2010/main" val="492997234"/>
+                <p14:modId xmlns:p14="http://schemas.microsoft.com/office/powerpoint/2010/main" val="2261488213"/>
               </p:ext>
             </p:extLst>
           </p:nvPr>
@@ -23548,7 +24280,7 @@
           <a:graphicData uri="http://schemas.openxmlformats.org/presentationml/2006/ole">
             <mc:AlternateContent xmlns:mc="http://schemas.openxmlformats.org/markup-compatibility/2006">
               <mc:Choice xmlns:v="urn:schemas-microsoft-com:vml" Requires="v">
-                <p:oleObj spid="_x0000_s7175" name="Worksheet" showAsIcon="1" r:id="rId6" imgW="914400" imgH="771525" progId="Excel.Sheet.12">
+                <p:oleObj spid="_x0000_s7180" name="Worksheet" showAsIcon="1" r:id="rId6" imgW="914400" imgH="771525" progId="Excel.Sheet.12">
                   <p:embed/>
                 </p:oleObj>
               </mc:Choice>

</xml_diff>